<commit_message>
Fix validators (client & server), update doc, update pptx
</commit_message>
<xml_diff>
--- a/Presentazione/PresentazioneFilippoFinke.pptx
+++ b/Presentazione/PresentazioneFilippoFinke.pptx
@@ -6,20 +6,23 @@
   </p:sldMasterIdLst>
   <p:sldIdLst>
     <p:sldId id="256" r:id="rId2"/>
-    <p:sldId id="257" r:id="rId3"/>
-    <p:sldId id="258" r:id="rId4"/>
-    <p:sldId id="259" r:id="rId5"/>
+    <p:sldId id="272" r:id="rId3"/>
+    <p:sldId id="259" r:id="rId4"/>
+    <p:sldId id="273" r:id="rId5"/>
     <p:sldId id="260" r:id="rId6"/>
     <p:sldId id="261" r:id="rId7"/>
-    <p:sldId id="262" r:id="rId8"/>
-    <p:sldId id="263" r:id="rId9"/>
-    <p:sldId id="264" r:id="rId10"/>
-    <p:sldId id="265" r:id="rId11"/>
-    <p:sldId id="268" r:id="rId12"/>
-    <p:sldId id="267" r:id="rId13"/>
-    <p:sldId id="266" r:id="rId14"/>
-    <p:sldId id="269" r:id="rId15"/>
-    <p:sldId id="270" r:id="rId16"/>
+    <p:sldId id="274" r:id="rId8"/>
+    <p:sldId id="262" r:id="rId9"/>
+    <p:sldId id="263" r:id="rId10"/>
+    <p:sldId id="264" r:id="rId11"/>
+    <p:sldId id="265" r:id="rId12"/>
+    <p:sldId id="268" r:id="rId13"/>
+    <p:sldId id="267" r:id="rId14"/>
+    <p:sldId id="266" r:id="rId15"/>
+    <p:sldId id="275" r:id="rId16"/>
+    <p:sldId id="271" r:id="rId17"/>
+    <p:sldId id="269" r:id="rId18"/>
+    <p:sldId id="270" r:id="rId19"/>
   </p:sldIdLst>
   <p:sldSz cx="12192000" cy="6858000"/>
   <p:notesSz cx="6858000" cy="9144000"/>
@@ -118,6 +121,11 @@
       </a:defRPr>
     </a:lvl9pPr>
   </p:defaultTextStyle>
+  <p:extLst>
+    <p:ext uri="{EFAFB233-063F-42B5-8137-9DF3F51BA10A}">
+      <p15:sldGuideLst xmlns:p15="http://schemas.microsoft.com/office/powerpoint/2012/main"/>
+    </p:ext>
+  </p:extLst>
 </p:presentation>
 </file>
 
@@ -252,7 +260,7 @@
           <a:p>
             <a:fld id="{C764DE79-268F-4C1A-8933-263129D2AF90}" type="datetimeFigureOut">
               <a:rPr lang="en-US" dirty="0"/>
-              <a:t>11/7/2018</a:t>
+              <a:t>11/9/2018</a:t>
             </a:fld>
             <a:endParaRPr lang="en-US" dirty="0"/>
           </a:p>
@@ -417,7 +425,7 @@
           <a:p>
             <a:fld id="{C764DE79-268F-4C1A-8933-263129D2AF90}" type="datetimeFigureOut">
               <a:rPr lang="en-US" dirty="0"/>
-              <a:t>11/7/2018</a:t>
+              <a:t>11/9/2018</a:t>
             </a:fld>
             <a:endParaRPr lang="en-US" dirty="0"/>
           </a:p>
@@ -592,7 +600,7 @@
           <a:p>
             <a:fld id="{C764DE79-268F-4C1A-8933-263129D2AF90}" type="datetimeFigureOut">
               <a:rPr lang="en-US" dirty="0"/>
-              <a:t>11/7/2018</a:t>
+              <a:t>11/9/2018</a:t>
             </a:fld>
             <a:endParaRPr lang="en-US" dirty="0"/>
           </a:p>
@@ -757,7 +765,7 @@
           <a:p>
             <a:fld id="{C764DE79-268F-4C1A-8933-263129D2AF90}" type="datetimeFigureOut">
               <a:rPr lang="en-US" dirty="0"/>
-              <a:t>11/7/2018</a:t>
+              <a:t>11/9/2018</a:t>
             </a:fld>
             <a:endParaRPr lang="en-US" dirty="0"/>
           </a:p>
@@ -998,7 +1006,7 @@
           <a:p>
             <a:fld id="{C764DE79-268F-4C1A-8933-263129D2AF90}" type="datetimeFigureOut">
               <a:rPr lang="en-US" dirty="0"/>
-              <a:t>11/7/2018</a:t>
+              <a:t>11/9/2018</a:t>
             </a:fld>
             <a:endParaRPr lang="en-US" dirty="0"/>
           </a:p>
@@ -1225,7 +1233,7 @@
           <a:p>
             <a:fld id="{C764DE79-268F-4C1A-8933-263129D2AF90}" type="datetimeFigureOut">
               <a:rPr lang="en-US" dirty="0"/>
-              <a:t>11/7/2018</a:t>
+              <a:t>11/9/2018</a:t>
             </a:fld>
             <a:endParaRPr lang="en-US" dirty="0"/>
           </a:p>
@@ -1587,7 +1595,7 @@
           <a:p>
             <a:fld id="{C764DE79-268F-4C1A-8933-263129D2AF90}" type="datetimeFigureOut">
               <a:rPr lang="en-US" dirty="0"/>
-              <a:t>11/7/2018</a:t>
+              <a:t>11/9/2018</a:t>
             </a:fld>
             <a:endParaRPr lang="en-US" dirty="0"/>
           </a:p>
@@ -1700,7 +1708,7 @@
           <a:p>
             <a:fld id="{C764DE79-268F-4C1A-8933-263129D2AF90}" type="datetimeFigureOut">
               <a:rPr lang="en-US" dirty="0"/>
-              <a:t>11/7/2018</a:t>
+              <a:t>11/9/2018</a:t>
             </a:fld>
             <a:endParaRPr lang="en-US" dirty="0"/>
           </a:p>
@@ -1790,7 +1798,7 @@
           <a:p>
             <a:fld id="{C764DE79-268F-4C1A-8933-263129D2AF90}" type="datetimeFigureOut">
               <a:rPr lang="en-US" dirty="0"/>
-              <a:t>11/7/2018</a:t>
+              <a:t>11/9/2018</a:t>
             </a:fld>
             <a:endParaRPr lang="en-US" dirty="0"/>
           </a:p>
@@ -2062,7 +2070,7 @@
           <a:p>
             <a:fld id="{C764DE79-268F-4C1A-8933-263129D2AF90}" type="datetimeFigureOut">
               <a:rPr lang="en-US" dirty="0"/>
-              <a:t>11/7/2018</a:t>
+              <a:t>11/9/2018</a:t>
             </a:fld>
             <a:endParaRPr lang="en-US" dirty="0"/>
           </a:p>
@@ -2314,7 +2322,7 @@
           <a:p>
             <a:fld id="{C764DE79-268F-4C1A-8933-263129D2AF90}" type="datetimeFigureOut">
               <a:rPr lang="en-US" dirty="0"/>
-              <a:t>11/7/2018</a:t>
+              <a:t>11/9/2018</a:t>
             </a:fld>
             <a:endParaRPr lang="en-US" dirty="0"/>
           </a:p>
@@ -2522,7 +2530,7 @@
           <a:p>
             <a:fld id="{C764DE79-268F-4C1A-8933-263129D2AF90}" type="datetimeFigureOut">
               <a:rPr lang="en-US" dirty="0"/>
-              <a:t>11/7/2018</a:t>
+              <a:t>11/9/2018</a:t>
             </a:fld>
             <a:endParaRPr lang="en-US" dirty="0"/>
           </a:p>
@@ -3021,6 +3029,95 @@
           <a:p>
             <a:r>
               <a:rPr lang="it-CH" dirty="0" smtClean="0"/>
+              <a:t>Pagina di controllo.	</a:t>
+            </a:r>
+            <a:endParaRPr lang="it-CH" dirty="0"/>
+          </a:p>
+        </p:txBody>
+      </p:sp>
+      <p:pic>
+        <p:nvPicPr>
+          <p:cNvPr id="4" name="Content Placeholder 3"/>
+          <p:cNvPicPr>
+            <a:picLocks noGrp="1" noChangeAspect="1"/>
+          </p:cNvPicPr>
+          <p:nvPr>
+            <p:ph idx="1"/>
+          </p:nvPr>
+        </p:nvPicPr>
+        <p:blipFill>
+          <a:blip r:embed="rId2">
+            <a:extLst>
+              <a:ext uri="{28A0092B-C50C-407E-A947-70E740481C1C}">
+                <a14:useLocalDpi xmlns:a14="http://schemas.microsoft.com/office/drawing/2010/main" val="0"/>
+              </a:ext>
+            </a:extLst>
+          </a:blip>
+          <a:stretch>
+            <a:fillRect/>
+          </a:stretch>
+        </p:blipFill>
+        <p:spPr>
+          <a:xfrm>
+            <a:off x="1586191" y="1825625"/>
+            <a:ext cx="9019617" cy="4351338"/>
+          </a:xfrm>
+        </p:spPr>
+      </p:pic>
+    </p:spTree>
+    <p:extLst>
+      <p:ext uri="{BB962C8B-B14F-4D97-AF65-F5344CB8AC3E}">
+        <p14:creationId xmlns:p14="http://schemas.microsoft.com/office/powerpoint/2010/main" val="3969695326"/>
+      </p:ext>
+    </p:extLst>
+  </p:cSld>
+  <p:clrMapOvr>
+    <a:masterClrMapping/>
+  </p:clrMapOvr>
+  <p:timing>
+    <p:tnLst>
+      <p:par>
+        <p:cTn id="1" dur="indefinite" restart="never" nodeType="tmRoot"/>
+      </p:par>
+    </p:tnLst>
+  </p:timing>
+</p:sld>
+</file>
+
+<file path=ppt/slides/slide11.xml><?xml version="1.0" encoding="utf-8"?>
+<p:sld xmlns:a="http://schemas.openxmlformats.org/drawingml/2006/main" xmlns:r="http://schemas.openxmlformats.org/officeDocument/2006/relationships" xmlns:p="http://schemas.openxmlformats.org/presentationml/2006/main">
+  <p:cSld>
+    <p:spTree>
+      <p:nvGrpSpPr>
+        <p:cNvPr id="1" name=""/>
+        <p:cNvGrpSpPr/>
+        <p:nvPr/>
+      </p:nvGrpSpPr>
+      <p:grpSpPr>
+        <a:xfrm>
+          <a:off x="0" y="0"/>
+          <a:ext cx="0" cy="0"/>
+          <a:chOff x="0" y="0"/>
+          <a:chExt cx="0" cy="0"/>
+        </a:xfrm>
+      </p:grpSpPr>
+      <p:sp>
+        <p:nvSpPr>
+          <p:cNvPr id="2" name="Title 1"/>
+          <p:cNvSpPr>
+            <a:spLocks noGrp="1"/>
+          </p:cNvSpPr>
+          <p:nvPr>
+            <p:ph type="title"/>
+          </p:nvPr>
+        </p:nvSpPr>
+        <p:spPr/>
+        <p:txBody>
+          <a:bodyPr/>
+          <a:lstStyle/>
+          <a:p>
+            <a:r>
+              <a:rPr lang="it-CH" dirty="0" smtClean="0"/>
               <a:t>Pagina finale.</a:t>
             </a:r>
             <a:endParaRPr lang="it-CH" dirty="0"/>
@@ -3076,7 +3173,7 @@
 </p:sld>
 </file>
 
-<file path=ppt/slides/slide11.xml><?xml version="1.0" encoding="utf-8"?>
+<file path=ppt/slides/slide12.xml><?xml version="1.0" encoding="utf-8"?>
 <p:sld xmlns:a="http://schemas.openxmlformats.org/drawingml/2006/main" xmlns:r="http://schemas.openxmlformats.org/officeDocument/2006/relationships" xmlns:p="http://schemas.openxmlformats.org/presentationml/2006/main">
   <p:cSld>
     <p:spTree>
@@ -3162,7 +3259,7 @@
 </p:sld>
 </file>
 
-<file path=ppt/slides/slide12.xml><?xml version="1.0" encoding="utf-8"?>
+<file path=ppt/slides/slide13.xml><?xml version="1.0" encoding="utf-8"?>
 <p:sld xmlns:a="http://schemas.openxmlformats.org/drawingml/2006/main" xmlns:r="http://schemas.openxmlformats.org/officeDocument/2006/relationships" xmlns:p="http://schemas.openxmlformats.org/presentationml/2006/main">
   <p:cSld>
     <p:spTree>
@@ -3272,7 +3369,7 @@
 </p:sld>
 </file>
 
-<file path=ppt/slides/slide13.xml><?xml version="1.0" encoding="utf-8"?>
+<file path=ppt/slides/slide14.xml><?xml version="1.0" encoding="utf-8"?>
 <p:sld xmlns:a="http://schemas.openxmlformats.org/drawingml/2006/main" xmlns:r="http://schemas.openxmlformats.org/officeDocument/2006/relationships" xmlns:p="http://schemas.openxmlformats.org/presentationml/2006/main">
   <p:cSld>
     <p:spTree>
@@ -3358,7 +3455,7 @@
 </p:sld>
 </file>
 
-<file path=ppt/slides/slide14.xml><?xml version="1.0" encoding="utf-8"?>
+<file path=ppt/slides/slide15.xml><?xml version="1.0" encoding="utf-8"?>
 <p:sld xmlns:a="http://schemas.openxmlformats.org/drawingml/2006/main" xmlns:r="http://schemas.openxmlformats.org/officeDocument/2006/relationships" xmlns:p="http://schemas.openxmlformats.org/presentationml/2006/main">
   <p:cSld>
     <p:spTree>
@@ -3392,6 +3489,253 @@
           <a:p>
             <a:r>
               <a:rPr lang="it-CH" dirty="0" smtClean="0"/>
+              <a:t>Test.</a:t>
+            </a:r>
+            <a:endParaRPr lang="it-CH" dirty="0"/>
+          </a:p>
+        </p:txBody>
+      </p:sp>
+      <p:sp>
+        <p:nvSpPr>
+          <p:cNvPr id="3" name="Content Placeholder 2"/>
+          <p:cNvSpPr>
+            <a:spLocks noGrp="1"/>
+          </p:cNvSpPr>
+          <p:nvPr>
+            <p:ph idx="1"/>
+          </p:nvPr>
+        </p:nvSpPr>
+        <p:spPr>
+          <a:xfrm>
+            <a:off x="2184862" y="2274512"/>
+            <a:ext cx="10515600" cy="4351338"/>
+          </a:xfrm>
+        </p:spPr>
+        <p:txBody>
+          <a:bodyPr>
+            <a:normAutofit/>
+          </a:bodyPr>
+          <a:lstStyle/>
+          <a:p>
+            <a:r>
+              <a:rPr lang="it-CH" sz="4000" dirty="0" smtClean="0"/>
+              <a:t>Controllo validazione dei dati</a:t>
+            </a:r>
+          </a:p>
+          <a:p>
+            <a:r>
+              <a:rPr lang="it-CH" sz="4000" dirty="0" smtClean="0"/>
+              <a:t>Test classe di gestione file csv</a:t>
+            </a:r>
+          </a:p>
+          <a:p>
+            <a:r>
+              <a:rPr lang="it-CH" sz="4000" dirty="0" smtClean="0"/>
+              <a:t>Test funzione cancella e correggi</a:t>
+            </a:r>
+            <a:endParaRPr lang="it-CH" sz="4000" dirty="0"/>
+          </a:p>
+        </p:txBody>
+      </p:sp>
+    </p:spTree>
+    <p:extLst>
+      <p:ext uri="{BB962C8B-B14F-4D97-AF65-F5344CB8AC3E}">
+        <p14:creationId xmlns:p14="http://schemas.microsoft.com/office/powerpoint/2010/main" val="3120250458"/>
+      </p:ext>
+    </p:extLst>
+  </p:cSld>
+  <p:clrMapOvr>
+    <a:masterClrMapping/>
+  </p:clrMapOvr>
+  <p:timing>
+    <p:tnLst>
+      <p:par>
+        <p:cTn id="1" dur="indefinite" restart="never" nodeType="tmRoot"/>
+      </p:par>
+    </p:tnLst>
+  </p:timing>
+</p:sld>
+</file>
+
+<file path=ppt/slides/slide16.xml><?xml version="1.0" encoding="utf-8"?>
+<p:sld xmlns:a="http://schemas.openxmlformats.org/drawingml/2006/main" xmlns:r="http://schemas.openxmlformats.org/officeDocument/2006/relationships" xmlns:p="http://schemas.openxmlformats.org/presentationml/2006/main">
+  <p:cSld>
+    <p:spTree>
+      <p:nvGrpSpPr>
+        <p:cNvPr id="1" name=""/>
+        <p:cNvGrpSpPr/>
+        <p:nvPr/>
+      </p:nvGrpSpPr>
+      <p:grpSpPr>
+        <a:xfrm>
+          <a:off x="0" y="0"/>
+          <a:ext cx="0" cy="0"/>
+          <a:chOff x="0" y="0"/>
+          <a:chExt cx="0" cy="0"/>
+        </a:xfrm>
+      </p:grpSpPr>
+      <p:sp>
+        <p:nvSpPr>
+          <p:cNvPr id="2" name="Title 1"/>
+          <p:cNvSpPr>
+            <a:spLocks noGrp="1"/>
+          </p:cNvSpPr>
+          <p:nvPr>
+            <p:ph type="title"/>
+          </p:nvPr>
+        </p:nvSpPr>
+        <p:spPr/>
+        <p:txBody>
+          <a:bodyPr/>
+          <a:lstStyle/>
+          <a:p>
+            <a:r>
+              <a:rPr lang="it-CH" dirty="0" smtClean="0"/>
+              <a:t>Mancanze conosciute.</a:t>
+            </a:r>
+            <a:endParaRPr lang="it-CH" dirty="0"/>
+          </a:p>
+        </p:txBody>
+      </p:sp>
+      <p:pic>
+        <p:nvPicPr>
+          <p:cNvPr id="1026" name="Picture 2" descr="InternetExplorerError"/>
+          <p:cNvPicPr>
+            <a:picLocks noChangeAspect="1" noChangeArrowheads="1"/>
+          </p:cNvPicPr>
+          <p:nvPr/>
+        </p:nvPicPr>
+        <p:blipFill>
+          <a:blip r:embed="rId2">
+            <a:extLst>
+              <a:ext uri="{28A0092B-C50C-407E-A947-70E740481C1C}">
+                <a14:useLocalDpi xmlns:a14="http://schemas.microsoft.com/office/drawing/2010/main" val="0"/>
+              </a:ext>
+            </a:extLst>
+          </a:blip>
+          <a:srcRect/>
+          <a:stretch>
+            <a:fillRect/>
+          </a:stretch>
+        </p:blipFill>
+        <p:spPr bwMode="auto">
+          <a:xfrm>
+            <a:off x="2774489" y="2576944"/>
+            <a:ext cx="5523452" cy="1970116"/>
+          </a:xfrm>
+          <a:prstGeom prst="rect">
+            <a:avLst/>
+          </a:prstGeom>
+          <a:noFill/>
+          <a:ln>
+            <a:noFill/>
+          </a:ln>
+          <a:extLst>
+            <a:ext uri="{909E8E84-426E-40DD-AFC4-6F175D3DCCD1}">
+              <a14:hiddenFill xmlns:a14="http://schemas.microsoft.com/office/drawing/2010/main">
+                <a:solidFill>
+                  <a:srgbClr val="FFFFFF"/>
+                </a:solidFill>
+              </a14:hiddenFill>
+            </a:ext>
+            <a:ext uri="{91240B29-F687-4F45-9708-019B960494DF}">
+              <a14:hiddenLine xmlns:a14="http://schemas.microsoft.com/office/drawing/2010/main" w="9525">
+                <a:solidFill>
+                  <a:srgbClr val="000000"/>
+                </a:solidFill>
+                <a:miter lim="800000"/>
+                <a:headEnd/>
+                <a:tailEnd/>
+              </a14:hiddenLine>
+            </a:ext>
+          </a:extLst>
+        </p:spPr>
+      </p:pic>
+      <p:sp>
+        <p:nvSpPr>
+          <p:cNvPr id="4" name="TextBox 3"/>
+          <p:cNvSpPr txBox="1"/>
+          <p:nvPr/>
+        </p:nvSpPr>
+        <p:spPr>
+          <a:xfrm>
+            <a:off x="2774489" y="1886988"/>
+            <a:ext cx="5228706" cy="584775"/>
+          </a:xfrm>
+          <a:prstGeom prst="rect">
+            <a:avLst/>
+          </a:prstGeom>
+          <a:noFill/>
+        </p:spPr>
+        <p:txBody>
+          <a:bodyPr wrap="square" rtlCol="0">
+            <a:spAutoFit/>
+          </a:bodyPr>
+          <a:lstStyle/>
+          <a:p>
+            <a:pPr algn="ctr"/>
+            <a:r>
+              <a:rPr lang="it-CH" sz="3200" dirty="0" smtClean="0"/>
+              <a:t>Internet Explorer</a:t>
+            </a:r>
+            <a:endParaRPr lang="it-CH" sz="3200" dirty="0"/>
+          </a:p>
+        </p:txBody>
+      </p:sp>
+    </p:spTree>
+    <p:extLst>
+      <p:ext uri="{BB962C8B-B14F-4D97-AF65-F5344CB8AC3E}">
+        <p14:creationId xmlns:p14="http://schemas.microsoft.com/office/powerpoint/2010/main" val="471368030"/>
+      </p:ext>
+    </p:extLst>
+  </p:cSld>
+  <p:clrMapOvr>
+    <a:masterClrMapping/>
+  </p:clrMapOvr>
+  <p:timing>
+    <p:tnLst>
+      <p:par>
+        <p:cTn id="1" dur="indefinite" restart="never" nodeType="tmRoot"/>
+      </p:par>
+    </p:tnLst>
+  </p:timing>
+</p:sld>
+</file>
+
+<file path=ppt/slides/slide17.xml><?xml version="1.0" encoding="utf-8"?>
+<p:sld xmlns:a="http://schemas.openxmlformats.org/drawingml/2006/main" xmlns:r="http://schemas.openxmlformats.org/officeDocument/2006/relationships" xmlns:p="http://schemas.openxmlformats.org/presentationml/2006/main">
+  <p:cSld>
+    <p:spTree>
+      <p:nvGrpSpPr>
+        <p:cNvPr id="1" name=""/>
+        <p:cNvGrpSpPr/>
+        <p:nvPr/>
+      </p:nvGrpSpPr>
+      <p:grpSpPr>
+        <a:xfrm>
+          <a:off x="0" y="0"/>
+          <a:ext cx="0" cy="0"/>
+          <a:chOff x="0" y="0"/>
+          <a:chExt cx="0" cy="0"/>
+        </a:xfrm>
+      </p:grpSpPr>
+      <p:sp>
+        <p:nvSpPr>
+          <p:cNvPr id="2" name="Title 1"/>
+          <p:cNvSpPr>
+            <a:spLocks noGrp="1"/>
+          </p:cNvSpPr>
+          <p:nvPr>
+            <p:ph type="title"/>
+          </p:nvPr>
+        </p:nvSpPr>
+        <p:spPr/>
+        <p:txBody>
+          <a:bodyPr/>
+          <a:lstStyle/>
+          <a:p>
+            <a:r>
+              <a:rPr lang="it-CH" dirty="0" smtClean="0"/>
               <a:t>Sviluppi futuri.</a:t>
             </a:r>
             <a:endParaRPr lang="it-CH" dirty="0"/>
@@ -3416,8 +3760,8 @@
         </p:blipFill>
         <p:spPr>
           <a:xfrm>
-            <a:off x="1513836" y="2553239"/>
-            <a:ext cx="15745491" cy="1881536"/>
+            <a:off x="1470337" y="2514600"/>
+            <a:ext cx="16635657" cy="1987908"/>
           </a:xfrm>
           <a:prstGeom prst="rect">
             <a:avLst/>
@@ -3444,7 +3788,7 @@
 </p:sld>
 </file>
 
-<file path=ppt/slides/slide15.xml><?xml version="1.0" encoding="utf-8"?>
+<file path=ppt/slides/slide18.xml><?xml version="1.0" encoding="utf-8"?>
 <p:sld xmlns:a="http://schemas.openxmlformats.org/drawingml/2006/main" xmlns:r="http://schemas.openxmlformats.org/officeDocument/2006/relationships" xmlns:p="http://schemas.openxmlformats.org/presentationml/2006/main">
   <p:cSld>
     <p:spTree>
@@ -3471,39 +3815,23 @@
             <p:ph type="title"/>
           </p:nvPr>
         </p:nvSpPr>
-        <p:spPr/>
-        <p:txBody>
-          <a:bodyPr/>
-          <a:lstStyle/>
-          <a:p>
-            <a:r>
-              <a:rPr lang="it-CH" dirty="0" smtClean="0"/>
-              <a:t>Conclusione.</a:t>
-            </a:r>
-            <a:endParaRPr lang="it-CH" dirty="0"/>
-          </a:p>
-        </p:txBody>
-      </p:sp>
-      <p:sp>
-        <p:nvSpPr>
-          <p:cNvPr id="3" name="Content Placeholder 2"/>
-          <p:cNvSpPr>
-            <a:spLocks noGrp="1"/>
-          </p:cNvSpPr>
-          <p:nvPr>
-            <p:ph idx="1"/>
-          </p:nvPr>
-        </p:nvSpPr>
-        <p:spPr/>
-        <p:txBody>
-          <a:bodyPr/>
-          <a:lstStyle/>
-          <a:p>
-            <a:r>
-              <a:rPr lang="it-CH" dirty="0" smtClean="0"/>
-              <a:t>    </a:t>
-            </a:r>
-            <a:endParaRPr lang="it-CH" dirty="0"/>
+        <p:spPr>
+          <a:xfrm>
+            <a:off x="4152207" y="2550294"/>
+            <a:ext cx="4188537" cy="1325563"/>
+          </a:xfrm>
+        </p:spPr>
+        <p:txBody>
+          <a:bodyPr>
+            <a:normAutofit fontScale="90000"/>
+          </a:bodyPr>
+          <a:lstStyle/>
+          <a:p>
+            <a:r>
+              <a:rPr lang="it-CH" sz="6600" dirty="0" smtClean="0"/>
+              <a:t>Conclusioni.</a:t>
+            </a:r>
+            <a:endParaRPr lang="it-CH" sz="6600" dirty="0"/>
           </a:p>
         </p:txBody>
       </p:sp>
@@ -3561,45 +3889,46 @@
           <a:p>
             <a:r>
               <a:rPr lang="it-CH" dirty="0" smtClean="0"/>
-              <a:t>Prima dell’innovazione.</a:t>
+              <a:t>Introduzione.</a:t>
             </a:r>
             <a:endParaRPr lang="it-CH" dirty="0"/>
           </a:p>
         </p:txBody>
       </p:sp>
-      <p:pic>
-        <p:nvPicPr>
-          <p:cNvPr id="4" name="Content Placeholder 3"/>
-          <p:cNvPicPr>
-            <a:picLocks noGrp="1" noChangeAspect="1"/>
-          </p:cNvPicPr>
+      <p:sp>
+        <p:nvSpPr>
+          <p:cNvPr id="3" name="Content Placeholder 2"/>
+          <p:cNvSpPr>
+            <a:spLocks noGrp="1"/>
+          </p:cNvSpPr>
           <p:nvPr>
             <p:ph idx="1"/>
           </p:nvPr>
-        </p:nvPicPr>
-        <p:blipFill>
-          <a:blip r:embed="rId2">
-            <a:extLst>
-              <a:ext uri="{28A0092B-C50C-407E-A947-70E740481C1C}">
-                <a14:useLocalDpi xmlns:a14="http://schemas.microsoft.com/office/drawing/2010/main" val="0"/>
-              </a:ext>
-            </a:extLst>
-          </a:blip>
-          <a:stretch>
-            <a:fillRect/>
-          </a:stretch>
-        </p:blipFill>
+        </p:nvSpPr>
         <p:spPr>
           <a:xfrm>
-            <a:off x="3597333" y="2064082"/>
-            <a:ext cx="4648200" cy="3009900"/>
+            <a:off x="1743594" y="3130723"/>
+            <a:ext cx="8704811" cy="784571"/>
           </a:xfrm>
         </p:spPr>
-      </p:pic>
+        <p:txBody>
+          <a:bodyPr>
+            <a:noAutofit/>
+          </a:bodyPr>
+          <a:lstStyle/>
+          <a:p>
+            <a:r>
+              <a:rPr lang="it-CH" sz="4000" dirty="0" smtClean="0"/>
+              <a:t>Applicativo WEB per la raccolta di dati.</a:t>
+            </a:r>
+            <a:endParaRPr lang="it-CH" sz="4000" dirty="0"/>
+          </a:p>
+        </p:txBody>
+      </p:sp>
     </p:spTree>
     <p:extLst>
       <p:ext uri="{BB962C8B-B14F-4D97-AF65-F5344CB8AC3E}">
-        <p14:creationId xmlns:p14="http://schemas.microsoft.com/office/powerpoint/2010/main" val="2731554291"/>
+        <p14:creationId xmlns:p14="http://schemas.microsoft.com/office/powerpoint/2010/main" val="528200352"/>
       </p:ext>
     </p:extLst>
   </p:cSld>
@@ -3633,92 +3962,75 @@
           <a:chExt cx="0" cy="0"/>
         </a:xfrm>
       </p:grpSpPr>
-      <p:pic>
-        <p:nvPicPr>
-          <p:cNvPr id="4" name="Content Placeholder 3"/>
-          <p:cNvPicPr>
-            <a:picLocks noGrp="1" noChangeAspect="1"/>
-          </p:cNvPicPr>
+      <p:sp>
+        <p:nvSpPr>
+          <p:cNvPr id="2" name="Title 1"/>
+          <p:cNvSpPr>
+            <a:spLocks noGrp="1"/>
+          </p:cNvSpPr>
+          <p:nvPr>
+            <p:ph type="title"/>
+          </p:nvPr>
+        </p:nvSpPr>
+        <p:spPr/>
+        <p:txBody>
+          <a:bodyPr/>
+          <a:lstStyle/>
+          <a:p>
+            <a:r>
+              <a:rPr lang="it-CH" dirty="0" smtClean="0"/>
+              <a:t>Scopo.</a:t>
+            </a:r>
+            <a:endParaRPr lang="it-CH" dirty="0"/>
+          </a:p>
+        </p:txBody>
+      </p:sp>
+      <p:sp>
+        <p:nvSpPr>
+          <p:cNvPr id="3" name="Content Placeholder 2"/>
+          <p:cNvSpPr>
+            <a:spLocks noGrp="1"/>
+          </p:cNvSpPr>
           <p:nvPr>
             <p:ph idx="1"/>
           </p:nvPr>
-        </p:nvPicPr>
-        <p:blipFill>
-          <a:blip r:embed="rId2">
-            <a:extLst>
-              <a:ext uri="{28A0092B-C50C-407E-A947-70E740481C1C}">
-                <a14:useLocalDpi xmlns:a14="http://schemas.microsoft.com/office/drawing/2010/main" val="0"/>
-              </a:ext>
-            </a:extLst>
-          </a:blip>
-          <a:stretch>
-            <a:fillRect/>
-          </a:stretch>
-        </p:blipFill>
+        </p:nvSpPr>
         <p:spPr>
           <a:xfrm>
-            <a:off x="3414992" y="1690688"/>
-            <a:ext cx="4418459" cy="4418459"/>
+            <a:off x="4312227" y="1943274"/>
+            <a:ext cx="3567545" cy="2520661"/>
           </a:xfrm>
         </p:spPr>
-      </p:pic>
-      <p:sp>
-        <p:nvSpPr>
-          <p:cNvPr id="2" name="Title 1"/>
-          <p:cNvSpPr>
-            <a:spLocks noGrp="1"/>
-          </p:cNvSpPr>
-          <p:nvPr>
-            <p:ph type="title"/>
-          </p:nvPr>
-        </p:nvSpPr>
-        <p:spPr/>
-        <p:txBody>
-          <a:bodyPr/>
-          <a:lstStyle/>
-          <a:p>
-            <a:r>
-              <a:rPr lang="it-CH" dirty="0" smtClean="0"/>
-              <a:t>Ora.</a:t>
-            </a:r>
-            <a:endParaRPr lang="it-CH" dirty="0"/>
-          </a:p>
-        </p:txBody>
-      </p:sp>
-      <p:pic>
-        <p:nvPicPr>
-          <p:cNvPr id="5" name="Picture 4"/>
-          <p:cNvPicPr>
-            <a:picLocks noChangeAspect="1"/>
-          </p:cNvPicPr>
-          <p:nvPr/>
-        </p:nvPicPr>
-        <p:blipFill>
-          <a:blip r:embed="rId3">
-            <a:extLst>
-              <a:ext uri="{28A0092B-C50C-407E-A947-70E740481C1C}">
-                <a14:useLocalDpi xmlns:a14="http://schemas.microsoft.com/office/drawing/2010/main" val="0"/>
-              </a:ext>
-            </a:extLst>
-          </a:blip>
-          <a:stretch>
-            <a:fillRect/>
-          </a:stretch>
-        </p:blipFill>
-        <p:spPr>
-          <a:xfrm>
-            <a:off x="838200" y="1381297"/>
-            <a:ext cx="10225492" cy="5037241"/>
-          </a:xfrm>
-          <a:prstGeom prst="rect">
-            <a:avLst/>
-          </a:prstGeom>
-        </p:spPr>
-      </p:pic>
+        <p:txBody>
+          <a:bodyPr>
+            <a:normAutofit/>
+          </a:bodyPr>
+          <a:lstStyle/>
+          <a:p>
+            <a:r>
+              <a:rPr lang="it-CH" sz="4000" dirty="0" smtClean="0"/>
+              <a:t>Semplificare</a:t>
+            </a:r>
+          </a:p>
+          <a:p>
+            <a:r>
+              <a:rPr lang="it-CH" sz="4000" dirty="0" smtClean="0"/>
+              <a:t>Velocizzare</a:t>
+            </a:r>
+          </a:p>
+          <a:p>
+            <a:r>
+              <a:rPr lang="it-CH" sz="4000" dirty="0" smtClean="0"/>
+              <a:t>Automatizzare</a:t>
+            </a:r>
+            <a:endParaRPr lang="it-CH" sz="4000" dirty="0"/>
+          </a:p>
+        </p:txBody>
+      </p:sp>
     </p:spTree>
     <p:extLst>
       <p:ext uri="{BB962C8B-B14F-4D97-AF65-F5344CB8AC3E}">
-        <p14:creationId xmlns:p14="http://schemas.microsoft.com/office/powerpoint/2010/main" val="3568852141"/>
+        <p14:creationId xmlns:p14="http://schemas.microsoft.com/office/powerpoint/2010/main" val="23918867"/>
       </p:ext>
     </p:extLst>
   </p:cSld>
@@ -3728,83 +4040,7 @@
   <p:timing>
     <p:tnLst>
       <p:par>
-        <p:cTn id="1" dur="indefinite" restart="never" nodeType="tmRoot">
-          <p:childTnLst>
-            <p:seq concurrent="1" nextAc="seek">
-              <p:cTn id="2" dur="indefinite" nodeType="mainSeq">
-                <p:childTnLst>
-                  <p:par>
-                    <p:cTn id="3" fill="hold">
-                      <p:stCondLst>
-                        <p:cond delay="indefinite"/>
-                      </p:stCondLst>
-                      <p:childTnLst>
-                        <p:par>
-                          <p:cTn id="4" fill="hold">
-                            <p:stCondLst>
-                              <p:cond delay="0"/>
-                            </p:stCondLst>
-                            <p:childTnLst>
-                              <p:par>
-                                <p:cTn id="5" presetID="10" presetClass="entr" presetSubtype="0" fill="hold" nodeType="clickEffect">
-                                  <p:stCondLst>
-                                    <p:cond delay="0"/>
-                                  </p:stCondLst>
-                                  <p:childTnLst>
-                                    <p:set>
-                                      <p:cBhvr>
-                                        <p:cTn id="6" dur="1" fill="hold">
-                                          <p:stCondLst>
-                                            <p:cond delay="0"/>
-                                          </p:stCondLst>
-                                        </p:cTn>
-                                        <p:tgtEl>
-                                          <p:spTgt spid="5"/>
-                                        </p:tgtEl>
-                                        <p:attrNameLst>
-                                          <p:attrName>style.visibility</p:attrName>
-                                        </p:attrNameLst>
-                                      </p:cBhvr>
-                                      <p:to>
-                                        <p:strVal val="visible"/>
-                                      </p:to>
-                                    </p:set>
-                                    <p:animEffect transition="in" filter="fade">
-                                      <p:cBhvr>
-                                        <p:cTn id="7" dur="500"/>
-                                        <p:tgtEl>
-                                          <p:spTgt spid="5"/>
-                                        </p:tgtEl>
-                                      </p:cBhvr>
-                                    </p:animEffect>
-                                  </p:childTnLst>
-                                </p:cTn>
-                              </p:par>
-                            </p:childTnLst>
-                          </p:cTn>
-                        </p:par>
-                      </p:childTnLst>
-                    </p:cTn>
-                  </p:par>
-                </p:childTnLst>
-              </p:cTn>
-              <p:prevCondLst>
-                <p:cond evt="onPrev" delay="0">
-                  <p:tgtEl>
-                    <p:sldTgt/>
-                  </p:tgtEl>
-                </p:cond>
-              </p:prevCondLst>
-              <p:nextCondLst>
-                <p:cond evt="onNext" delay="0">
-                  <p:tgtEl>
-                    <p:sldTgt/>
-                  </p:tgtEl>
-                </p:cond>
-              </p:nextCondLst>
-            </p:seq>
-          </p:childTnLst>
-        </p:cTn>
+        <p:cTn id="1" dur="indefinite" restart="never" nodeType="tmRoot"/>
       </p:par>
     </p:tnLst>
   </p:timing>
@@ -3845,7 +4081,7 @@
           <a:p>
             <a:r>
               <a:rPr lang="it-CH" dirty="0" smtClean="0"/>
-              <a:t>Scopo.</a:t>
+              <a:t>Requisiti.</a:t>
             </a:r>
             <a:endParaRPr lang="it-CH" dirty="0"/>
           </a:p>
@@ -3861,7 +4097,12 @@
             <p:ph idx="1"/>
           </p:nvPr>
         </p:nvSpPr>
-        <p:spPr/>
+        <p:spPr>
+          <a:xfrm>
+            <a:off x="2209107" y="1892127"/>
+            <a:ext cx="7773785" cy="4351338"/>
+          </a:xfrm>
+        </p:spPr>
         <p:txBody>
           <a:bodyPr>
             <a:normAutofit/>
@@ -3869,29 +4110,31 @@
           <a:lstStyle/>
           <a:p>
             <a:r>
-              <a:rPr lang="it-CH" sz="3600" dirty="0" smtClean="0"/>
-              <a:t>Semplificare</a:t>
-            </a:r>
-          </a:p>
-          <a:p>
-            <a:r>
-              <a:rPr lang="it-CH" sz="3600" dirty="0" smtClean="0"/>
-              <a:t>Velocizzare</a:t>
-            </a:r>
-          </a:p>
-          <a:p>
-            <a:r>
-              <a:rPr lang="it-CH" sz="3600" dirty="0" smtClean="0"/>
-              <a:t>Automatizzare</a:t>
-            </a:r>
-            <a:endParaRPr lang="it-CH" sz="3600" dirty="0"/>
+              <a:rPr lang="it-CH" sz="4000" dirty="0" smtClean="0"/>
+              <a:t>Applicativo WEB</a:t>
+            </a:r>
+          </a:p>
+          <a:p>
+            <a:r>
+              <a:rPr lang="it-CH" sz="4000" dirty="0" smtClean="0"/>
+              <a:t>Verifica di campi lato server / client</a:t>
+            </a:r>
+          </a:p>
+          <a:p>
+            <a:r>
+              <a:rPr lang="it-CH" sz="4000" dirty="0" smtClean="0"/>
+              <a:t>Salvataggio su file csv</a:t>
+            </a:r>
+          </a:p>
+          <a:p>
+            <a:endParaRPr lang="it-CH" sz="4000" dirty="0"/>
           </a:p>
         </p:txBody>
       </p:sp>
     </p:spTree>
     <p:extLst>
       <p:ext uri="{BB962C8B-B14F-4D97-AF65-F5344CB8AC3E}">
-        <p14:creationId xmlns:p14="http://schemas.microsoft.com/office/powerpoint/2010/main" val="23918867"/>
+        <p14:creationId xmlns:p14="http://schemas.microsoft.com/office/powerpoint/2010/main" val="698333174"/>
       </p:ext>
     </p:extLst>
   </p:cSld>
@@ -4120,6 +4363,120 @@
           <a:p>
             <a:r>
               <a:rPr lang="it-CH" dirty="0" smtClean="0"/>
+              <a:t>Struttura del sistema.</a:t>
+            </a:r>
+            <a:endParaRPr lang="it-CH" dirty="0"/>
+          </a:p>
+        </p:txBody>
+      </p:sp>
+      <p:pic>
+        <p:nvPicPr>
+          <p:cNvPr id="1026" name="Picture 2" descr="DesignInfrastruttura"/>
+          <p:cNvPicPr>
+            <a:picLocks noChangeAspect="1" noChangeArrowheads="1"/>
+          </p:cNvPicPr>
+          <p:nvPr/>
+        </p:nvPicPr>
+        <p:blipFill>
+          <a:blip r:embed="rId2">
+            <a:extLst>
+              <a:ext uri="{28A0092B-C50C-407E-A947-70E740481C1C}">
+                <a14:useLocalDpi xmlns:a14="http://schemas.microsoft.com/office/drawing/2010/main" val="0"/>
+              </a:ext>
+            </a:extLst>
+          </a:blip>
+          <a:srcRect/>
+          <a:stretch>
+            <a:fillRect/>
+          </a:stretch>
+        </p:blipFill>
+        <p:spPr bwMode="auto">
+          <a:xfrm>
+            <a:off x="1184248" y="2056418"/>
+            <a:ext cx="9823503" cy="3197225"/>
+          </a:xfrm>
+          <a:prstGeom prst="rect">
+            <a:avLst/>
+          </a:prstGeom>
+          <a:noFill/>
+          <a:ln>
+            <a:noFill/>
+          </a:ln>
+          <a:extLst>
+            <a:ext uri="{909E8E84-426E-40DD-AFC4-6F175D3DCCD1}">
+              <a14:hiddenFill xmlns:a14="http://schemas.microsoft.com/office/drawing/2010/main">
+                <a:solidFill>
+                  <a:srgbClr val="FFFFFF"/>
+                </a:solidFill>
+              </a14:hiddenFill>
+            </a:ext>
+            <a:ext uri="{91240B29-F687-4F45-9708-019B960494DF}">
+              <a14:hiddenLine xmlns:a14="http://schemas.microsoft.com/office/drawing/2010/main" w="9525">
+                <a:solidFill>
+                  <a:srgbClr val="000000"/>
+                </a:solidFill>
+                <a:miter lim="800000"/>
+                <a:headEnd/>
+                <a:tailEnd/>
+              </a14:hiddenLine>
+            </a:ext>
+          </a:extLst>
+        </p:spPr>
+      </p:pic>
+    </p:spTree>
+    <p:extLst>
+      <p:ext uri="{BB962C8B-B14F-4D97-AF65-F5344CB8AC3E}">
+        <p14:creationId xmlns:p14="http://schemas.microsoft.com/office/powerpoint/2010/main" val="4161284081"/>
+      </p:ext>
+    </p:extLst>
+  </p:cSld>
+  <p:clrMapOvr>
+    <a:masterClrMapping/>
+  </p:clrMapOvr>
+  <p:timing>
+    <p:tnLst>
+      <p:par>
+        <p:cTn id="1" dur="indefinite" restart="never" nodeType="tmRoot"/>
+      </p:par>
+    </p:tnLst>
+  </p:timing>
+</p:sld>
+</file>
+
+<file path=ppt/slides/slide8.xml><?xml version="1.0" encoding="utf-8"?>
+<p:sld xmlns:a="http://schemas.openxmlformats.org/drawingml/2006/main" xmlns:r="http://schemas.openxmlformats.org/officeDocument/2006/relationships" xmlns:p="http://schemas.openxmlformats.org/presentationml/2006/main">
+  <p:cSld>
+    <p:spTree>
+      <p:nvGrpSpPr>
+        <p:cNvPr id="1" name=""/>
+        <p:cNvGrpSpPr/>
+        <p:nvPr/>
+      </p:nvGrpSpPr>
+      <p:grpSpPr>
+        <a:xfrm>
+          <a:off x="0" y="0"/>
+          <a:ext cx="0" cy="0"/>
+          <a:chOff x="0" y="0"/>
+          <a:chExt cx="0" cy="0"/>
+        </a:xfrm>
+      </p:grpSpPr>
+      <p:sp>
+        <p:nvSpPr>
+          <p:cNvPr id="2" name="Title 1"/>
+          <p:cNvSpPr>
+            <a:spLocks noGrp="1"/>
+          </p:cNvSpPr>
+          <p:nvPr>
+            <p:ph type="title"/>
+          </p:nvPr>
+        </p:nvSpPr>
+        <p:spPr/>
+        <p:txBody>
+          <a:bodyPr/>
+          <a:lstStyle/>
+          <a:p>
+            <a:r>
+              <a:rPr lang="it-CH" dirty="0" smtClean="0"/>
               <a:t>Pagina di benvenuto.</a:t>
             </a:r>
             <a:endParaRPr lang="it-CH" dirty="0"/>
@@ -4175,7 +4532,7 @@
 </p:sld>
 </file>
 
-<file path=ppt/slides/slide8.xml><?xml version="1.0" encoding="utf-8"?>
+<file path=ppt/slides/slide9.xml><?xml version="1.0" encoding="utf-8"?>
 <p:sld xmlns:a="http://schemas.openxmlformats.org/drawingml/2006/main" xmlns:r="http://schemas.openxmlformats.org/officeDocument/2006/relationships" xmlns:p="http://schemas.openxmlformats.org/presentationml/2006/main">
   <p:cSld>
     <p:spTree>
@@ -4248,95 +4605,6 @@
     <p:extLst>
       <p:ext uri="{BB962C8B-B14F-4D97-AF65-F5344CB8AC3E}">
         <p14:creationId xmlns:p14="http://schemas.microsoft.com/office/powerpoint/2010/main" val="800446055"/>
-      </p:ext>
-    </p:extLst>
-  </p:cSld>
-  <p:clrMapOvr>
-    <a:masterClrMapping/>
-  </p:clrMapOvr>
-  <p:timing>
-    <p:tnLst>
-      <p:par>
-        <p:cTn id="1" dur="indefinite" restart="never" nodeType="tmRoot"/>
-      </p:par>
-    </p:tnLst>
-  </p:timing>
-</p:sld>
-</file>
-
-<file path=ppt/slides/slide9.xml><?xml version="1.0" encoding="utf-8"?>
-<p:sld xmlns:a="http://schemas.openxmlformats.org/drawingml/2006/main" xmlns:r="http://schemas.openxmlformats.org/officeDocument/2006/relationships" xmlns:p="http://schemas.openxmlformats.org/presentationml/2006/main">
-  <p:cSld>
-    <p:spTree>
-      <p:nvGrpSpPr>
-        <p:cNvPr id="1" name=""/>
-        <p:cNvGrpSpPr/>
-        <p:nvPr/>
-      </p:nvGrpSpPr>
-      <p:grpSpPr>
-        <a:xfrm>
-          <a:off x="0" y="0"/>
-          <a:ext cx="0" cy="0"/>
-          <a:chOff x="0" y="0"/>
-          <a:chExt cx="0" cy="0"/>
-        </a:xfrm>
-      </p:grpSpPr>
-      <p:sp>
-        <p:nvSpPr>
-          <p:cNvPr id="2" name="Title 1"/>
-          <p:cNvSpPr>
-            <a:spLocks noGrp="1"/>
-          </p:cNvSpPr>
-          <p:nvPr>
-            <p:ph type="title"/>
-          </p:nvPr>
-        </p:nvSpPr>
-        <p:spPr/>
-        <p:txBody>
-          <a:bodyPr/>
-          <a:lstStyle/>
-          <a:p>
-            <a:r>
-              <a:rPr lang="it-CH" dirty="0" smtClean="0"/>
-              <a:t>Pagina di controllo.	</a:t>
-            </a:r>
-            <a:endParaRPr lang="it-CH" dirty="0"/>
-          </a:p>
-        </p:txBody>
-      </p:sp>
-      <p:pic>
-        <p:nvPicPr>
-          <p:cNvPr id="4" name="Content Placeholder 3"/>
-          <p:cNvPicPr>
-            <a:picLocks noGrp="1" noChangeAspect="1"/>
-          </p:cNvPicPr>
-          <p:nvPr>
-            <p:ph idx="1"/>
-          </p:nvPr>
-        </p:nvPicPr>
-        <p:blipFill>
-          <a:blip r:embed="rId2">
-            <a:extLst>
-              <a:ext uri="{28A0092B-C50C-407E-A947-70E740481C1C}">
-                <a14:useLocalDpi xmlns:a14="http://schemas.microsoft.com/office/drawing/2010/main" val="0"/>
-              </a:ext>
-            </a:extLst>
-          </a:blip>
-          <a:stretch>
-            <a:fillRect/>
-          </a:stretch>
-        </p:blipFill>
-        <p:spPr>
-          <a:xfrm>
-            <a:off x="1586191" y="1825625"/>
-            <a:ext cx="9019617" cy="4351338"/>
-          </a:xfrm>
-        </p:spPr>
-      </p:pic>
-    </p:spTree>
-    <p:extLst>
-      <p:ext uri="{BB962C8B-B14F-4D97-AF65-F5344CB8AC3E}">
-        <p14:creationId xmlns:p14="http://schemas.microsoft.com/office/powerpoint/2010/main" val="3969695326"/>
       </p:ext>
     </p:extLst>
   </p:cSld>

</xml_diff>

<commit_message>
Aggiunto file globale, pptx fix
</commit_message>
<xml_diff>
--- a/Presentazione/PresentazioneFilippoFinke.pptx
+++ b/Presentazione/PresentazioneFilippoFinke.pptx
@@ -16,13 +16,14 @@
     <p:sldId id="263" r:id="rId10"/>
     <p:sldId id="264" r:id="rId11"/>
     <p:sldId id="265" r:id="rId12"/>
-    <p:sldId id="268" r:id="rId13"/>
-    <p:sldId id="267" r:id="rId14"/>
-    <p:sldId id="266" r:id="rId15"/>
-    <p:sldId id="275" r:id="rId16"/>
-    <p:sldId id="271" r:id="rId17"/>
-    <p:sldId id="269" r:id="rId18"/>
-    <p:sldId id="270" r:id="rId19"/>
+    <p:sldId id="276" r:id="rId13"/>
+    <p:sldId id="268" r:id="rId14"/>
+    <p:sldId id="267" r:id="rId15"/>
+    <p:sldId id="266" r:id="rId16"/>
+    <p:sldId id="275" r:id="rId17"/>
+    <p:sldId id="271" r:id="rId18"/>
+    <p:sldId id="269" r:id="rId19"/>
+    <p:sldId id="270" r:id="rId20"/>
   </p:sldIdLst>
   <p:sldSz cx="12192000" cy="6858000"/>
   <p:notesSz cx="6858000" cy="9144000"/>
@@ -3207,6 +3208,108 @@
           <a:p>
             <a:r>
               <a:rPr lang="it-CH" dirty="0" smtClean="0"/>
+              <a:t>Librerie.	</a:t>
+            </a:r>
+            <a:endParaRPr lang="it-CH" dirty="0"/>
+          </a:p>
+        </p:txBody>
+      </p:sp>
+      <p:sp>
+        <p:nvSpPr>
+          <p:cNvPr id="3" name="Content Placeholder 2"/>
+          <p:cNvSpPr>
+            <a:spLocks noGrp="1"/>
+          </p:cNvSpPr>
+          <p:nvPr>
+            <p:ph idx="1"/>
+          </p:nvPr>
+        </p:nvSpPr>
+        <p:spPr>
+          <a:xfrm>
+            <a:off x="4251266" y="2277687"/>
+            <a:ext cx="3504507" cy="2094807"/>
+          </a:xfrm>
+        </p:spPr>
+        <p:txBody>
+          <a:bodyPr>
+            <a:noAutofit/>
+          </a:bodyPr>
+          <a:lstStyle/>
+          <a:p>
+            <a:r>
+              <a:rPr lang="it-CH" sz="4000" dirty="0" smtClean="0"/>
+              <a:t>Notify.js</a:t>
+            </a:r>
+          </a:p>
+          <a:p>
+            <a:r>
+              <a:rPr lang="it-CH" sz="4000" dirty="0" smtClean="0"/>
+              <a:t>jQuery.js</a:t>
+            </a:r>
+          </a:p>
+          <a:p>
+            <a:r>
+              <a:rPr lang="it-CH" sz="4000" dirty="0" smtClean="0"/>
+              <a:t>Materialize</a:t>
+            </a:r>
+            <a:endParaRPr lang="it-CH" sz="4000" dirty="0"/>
+          </a:p>
+        </p:txBody>
+      </p:sp>
+    </p:spTree>
+    <p:extLst>
+      <p:ext uri="{BB962C8B-B14F-4D97-AF65-F5344CB8AC3E}">
+        <p14:creationId xmlns:p14="http://schemas.microsoft.com/office/powerpoint/2010/main" val="744439158"/>
+      </p:ext>
+    </p:extLst>
+  </p:cSld>
+  <p:clrMapOvr>
+    <a:masterClrMapping/>
+  </p:clrMapOvr>
+  <p:timing>
+    <p:tnLst>
+      <p:par>
+        <p:cTn id="1" dur="indefinite" restart="never" nodeType="tmRoot"/>
+      </p:par>
+    </p:tnLst>
+  </p:timing>
+</p:sld>
+</file>
+
+<file path=ppt/slides/slide13.xml><?xml version="1.0" encoding="utf-8"?>
+<p:sld xmlns:a="http://schemas.openxmlformats.org/drawingml/2006/main" xmlns:r="http://schemas.openxmlformats.org/officeDocument/2006/relationships" xmlns:p="http://schemas.openxmlformats.org/presentationml/2006/main">
+  <p:cSld>
+    <p:spTree>
+      <p:nvGrpSpPr>
+        <p:cNvPr id="1" name=""/>
+        <p:cNvGrpSpPr/>
+        <p:nvPr/>
+      </p:nvGrpSpPr>
+      <p:grpSpPr>
+        <a:xfrm>
+          <a:off x="0" y="0"/>
+          <a:ext cx="0" cy="0"/>
+          <a:chOff x="0" y="0"/>
+          <a:chExt cx="0" cy="0"/>
+        </a:xfrm>
+      </p:grpSpPr>
+      <p:sp>
+        <p:nvSpPr>
+          <p:cNvPr id="2" name="Title 1"/>
+          <p:cNvSpPr>
+            <a:spLocks noGrp="1"/>
+          </p:cNvSpPr>
+          <p:nvPr>
+            <p:ph type="title"/>
+          </p:nvPr>
+        </p:nvSpPr>
+        <p:spPr/>
+        <p:txBody>
+          <a:bodyPr/>
+          <a:lstStyle/>
+          <a:p>
+            <a:r>
+              <a:rPr lang="it-CH" dirty="0" smtClean="0"/>
               <a:t>Passaggio di dati tra pagine.</a:t>
             </a:r>
             <a:endParaRPr lang="it-CH" dirty="0"/>
@@ -3259,7 +3362,7 @@
 </p:sld>
 </file>
 
-<file path=ppt/slides/slide13.xml><?xml version="1.0" encoding="utf-8"?>
+<file path=ppt/slides/slide14.xml><?xml version="1.0" encoding="utf-8"?>
 <p:sld xmlns:a="http://schemas.openxmlformats.org/drawingml/2006/main" xmlns:r="http://schemas.openxmlformats.org/officeDocument/2006/relationships" xmlns:p="http://schemas.openxmlformats.org/presentationml/2006/main">
   <p:cSld>
     <p:spTree>
@@ -3369,7 +3472,7 @@
 </p:sld>
 </file>
 
-<file path=ppt/slides/slide14.xml><?xml version="1.0" encoding="utf-8"?>
+<file path=ppt/slides/slide15.xml><?xml version="1.0" encoding="utf-8"?>
 <p:sld xmlns:a="http://schemas.openxmlformats.org/drawingml/2006/main" xmlns:r="http://schemas.openxmlformats.org/officeDocument/2006/relationships" xmlns:p="http://schemas.openxmlformats.org/presentationml/2006/main">
   <p:cSld>
     <p:spTree>
@@ -3455,7 +3558,7 @@
 </p:sld>
 </file>
 
-<file path=ppt/slides/slide15.xml><?xml version="1.0" encoding="utf-8"?>
+<file path=ppt/slides/slide16.xml><?xml version="1.0" encoding="utf-8"?>
 <p:sld xmlns:a="http://schemas.openxmlformats.org/drawingml/2006/main" xmlns:r="http://schemas.openxmlformats.org/officeDocument/2006/relationships" xmlns:p="http://schemas.openxmlformats.org/presentationml/2006/main">
   <p:cSld>
     <p:spTree>
@@ -3557,7 +3660,7 @@
 </p:sld>
 </file>
 
-<file path=ppt/slides/slide16.xml><?xml version="1.0" encoding="utf-8"?>
+<file path=ppt/slides/slide17.xml><?xml version="1.0" encoding="utf-8"?>
 <p:sld xmlns:a="http://schemas.openxmlformats.org/drawingml/2006/main" xmlns:r="http://schemas.openxmlformats.org/officeDocument/2006/relationships" xmlns:p="http://schemas.openxmlformats.org/presentationml/2006/main">
   <p:cSld>
     <p:spTree>
@@ -3702,7 +3805,7 @@
 </p:sld>
 </file>
 
-<file path=ppt/slides/slide17.xml><?xml version="1.0" encoding="utf-8"?>
+<file path=ppt/slides/slide18.xml><?xml version="1.0" encoding="utf-8"?>
 <p:sld xmlns:a="http://schemas.openxmlformats.org/drawingml/2006/main" xmlns:r="http://schemas.openxmlformats.org/officeDocument/2006/relationships" xmlns:p="http://schemas.openxmlformats.org/presentationml/2006/main">
   <p:cSld>
     <p:spTree>
@@ -3788,7 +3891,7 @@
 </p:sld>
 </file>
 
-<file path=ppt/slides/slide18.xml><?xml version="1.0" encoding="utf-8"?>
+<file path=ppt/slides/slide19.xml><?xml version="1.0" encoding="utf-8"?>
 <p:sld xmlns:a="http://schemas.openxmlformats.org/drawingml/2006/main" xmlns:r="http://schemas.openxmlformats.org/officeDocument/2006/relationships" xmlns:p="http://schemas.openxmlformats.org/presentationml/2006/main">
   <p:cSld>
     <p:spTree>

</xml_diff>